<commit_message>
Review and update slides and exercises
</commit_message>
<xml_diff>
--- a/VideoSessionsMaterials/configuring-request.pptx
+++ b/VideoSessionsMaterials/configuring-request.pptx
@@ -1,21 +1,18 @@
 
 <file path=ppt/presentation.xml><?xml version="1.0" encoding="utf-8"?>
-<p:presentation xmlns:a="http://schemas.openxmlformats.org/drawingml/2006/main" xmlns:r="http://schemas.openxmlformats.org/officeDocument/2006/relationships" xmlns:p="http://schemas.openxmlformats.org/presentationml/2006/main" showSpecialPlsOnTitleSld="0" saveSubsetFonts="1" autoCompressPictures="0">
+<p:presentation xmlns:a="http://schemas.openxmlformats.org/drawingml/2006/main" xmlns:r="http://schemas.openxmlformats.org/officeDocument/2006/relationships" xmlns:mc="http://schemas.openxmlformats.org/markup-compatibility/2006" xmlns:mv="urn:schemas-microsoft-com:mac:vml" xmlns:p="http://schemas.openxmlformats.org/presentationml/2006/main" mc:Ignorable="mv" mc:PreserveAttributes="mv:*" showSpecialPlsOnTitleSld="0" saveSubsetFonts="1" autoCompressPictures="0">
   <p:sldMasterIdLst>
     <p:sldMasterId id="2147483648" r:id="rId1"/>
   </p:sldMasterIdLst>
   <p:notesMasterIdLst>
-    <p:notesMasterId r:id="rId10"/>
+    <p:notesMasterId r:id="rId7"/>
   </p:notesMasterIdLst>
   <p:sldIdLst>
     <p:sldId id="364" r:id="rId2"/>
     <p:sldId id="371" r:id="rId3"/>
     <p:sldId id="370" r:id="rId4"/>
-    <p:sldId id="326" r:id="rId5"/>
-    <p:sldId id="367" r:id="rId6"/>
-    <p:sldId id="368" r:id="rId7"/>
-    <p:sldId id="369" r:id="rId8"/>
-    <p:sldId id="322" r:id="rId9"/>
+    <p:sldId id="372" r:id="rId5"/>
+    <p:sldId id="322" r:id="rId6"/>
   </p:sldIdLst>
   <p:sldSz cx="17327563" cy="9747250"/>
   <p:notesSz cx="6858000" cy="9144000"/>
@@ -148,7 +145,7 @@
 </file>
 
 <file path=ppt/notesMasters/notesMaster1.xml><?xml version="1.0" encoding="utf-8"?>
-<p:notesMaster xmlns:a="http://schemas.openxmlformats.org/drawingml/2006/main" xmlns:r="http://schemas.openxmlformats.org/officeDocument/2006/relationships" xmlns:p="http://schemas.openxmlformats.org/presentationml/2006/main">
+<p:notesMaster xmlns:a="http://schemas.openxmlformats.org/drawingml/2006/main" xmlns:r="http://schemas.openxmlformats.org/officeDocument/2006/relationships" xmlns:mc="http://schemas.openxmlformats.org/markup-compatibility/2006" xmlns:mv="urn:schemas-microsoft-com:mac:vml" xmlns:p="http://schemas.openxmlformats.org/presentationml/2006/main" mc:Ignorable="mv" mc:PreserveAttributes="mv:*">
   <p:cSld>
     <p:bg>
       <p:bgRef idx="1001">
@@ -230,7 +227,7 @@
             <a:fld id="{DDC063FE-8627-9A42-970F-0BBEEB02B587}" type="datetimeFigureOut">
               <a:rPr lang="en-US" smtClean="0"/>
               <a:pPr/>
-              <a:t>12/5/13</a:t>
+              <a:t>12/6/13</a:t>
             </a:fld>
             <a:endParaRPr lang="en-US" dirty="0"/>
           </a:p>
@@ -399,7 +396,7 @@
     </p:spTree>
     <p:extLst>
       <p:ext uri="{BB962C8B-B14F-4D97-AF65-F5344CB8AC3E}">
-        <p14:creationId xmlns:p14="http://schemas.microsoft.com/office/powerpoint/2010/main" val="4045051341"/>
+        <p14:creationId xmlns:p14="http://schemas.microsoft.com/office/powerpoint/2010/main" xmlns:p="http://schemas.openxmlformats.org/presentationml/2006/main" xmlns:r="http://schemas.openxmlformats.org/officeDocument/2006/relationships" xmlns:a="http://schemas.openxmlformats.org/drawingml/2006/main" xmlns="" val="4045051341"/>
       </p:ext>
     </p:extLst>
   </p:cSld>
@@ -500,7 +497,7 @@
 </file>
 
 <file path=ppt/notesSlides/notesSlide1.xml><?xml version="1.0" encoding="utf-8"?>
-<p:notes xmlns:a="http://schemas.openxmlformats.org/drawingml/2006/main" xmlns:r="http://schemas.openxmlformats.org/officeDocument/2006/relationships" xmlns:p="http://schemas.openxmlformats.org/presentationml/2006/main">
+<p:notes xmlns:a="http://schemas.openxmlformats.org/drawingml/2006/main" xmlns:r="http://schemas.openxmlformats.org/officeDocument/2006/relationships" xmlns:mc="http://schemas.openxmlformats.org/markup-compatibility/2006" xmlns:mv="urn:schemas-microsoft-com:mac:vml" xmlns:p="http://schemas.openxmlformats.org/presentationml/2006/main" mc:Ignorable="mv" mc:PreserveAttributes="mv:*">
   <p:cSld>
     <p:spTree>
       <p:nvGrpSpPr>
@@ -574,7 +571,7 @@
     </p:spTree>
     <p:extLst>
       <p:ext uri="{BB962C8B-B14F-4D97-AF65-F5344CB8AC3E}">
-        <p14:creationId xmlns:p14="http://schemas.microsoft.com/office/powerpoint/2010/main" val="3250658828"/>
+        <p14:creationId xmlns:p14="http://schemas.microsoft.com/office/powerpoint/2010/main" xmlns:p="http://schemas.openxmlformats.org/presentationml/2006/main" xmlns:r="http://schemas.openxmlformats.org/officeDocument/2006/relationships" xmlns:a="http://schemas.openxmlformats.org/drawingml/2006/main" xmlns="" val="3250658828"/>
       </p:ext>
     </p:extLst>
   </p:cSld>
@@ -585,7 +582,7 @@
 </file>
 
 <file path=ppt/notesSlides/notesSlide2.xml><?xml version="1.0" encoding="utf-8"?>
-<p:notes xmlns:a="http://schemas.openxmlformats.org/drawingml/2006/main" xmlns:r="http://schemas.openxmlformats.org/officeDocument/2006/relationships" xmlns:p="http://schemas.openxmlformats.org/presentationml/2006/main">
+<p:notes xmlns:a="http://schemas.openxmlformats.org/drawingml/2006/main" xmlns:r="http://schemas.openxmlformats.org/officeDocument/2006/relationships" xmlns:mc="http://schemas.openxmlformats.org/markup-compatibility/2006" xmlns:mv="urn:schemas-microsoft-com:mac:vml" xmlns:p="http://schemas.openxmlformats.org/presentationml/2006/main" mc:Ignorable="mv" mc:PreserveAttributes="mv:*">
   <p:cSld>
     <p:spTree>
       <p:nvGrpSpPr>
@@ -623,14 +620,14 @@
           </a:ln>
           <a:extLst>
             <a:ext uri="{909E8E84-426E-40dd-AFC4-6F175D3DCCD1}">
-              <a14:hiddenFill xmlns:a14="http://schemas.microsoft.com/office/drawing/2010/main">
+              <a14:hiddenFill xmlns:a14="http://schemas.microsoft.com/office/drawing/2010/main" xmlns:p="http://schemas.openxmlformats.org/presentationml/2006/main" xmlns:r="http://schemas.openxmlformats.org/officeDocument/2006/relationships" xmlns:a="http://schemas.openxmlformats.org/drawingml/2006/main" xmlns="">
                 <a:solidFill>
                   <a:srgbClr val="FFFFFF"/>
                 </a:solidFill>
               </a14:hiddenFill>
             </a:ext>
             <a:ext uri="{FAA26D3D-D897-4be2-8F04-BA451C77F1D7}">
-              <ma14:placeholderFlag xmlns:ma14="http://schemas.microsoft.com/office/mac/drawingml/2011/main" val="1"/>
+              <ma14:placeholderFlag xmlns:ma14="http://schemas.microsoft.com/office/mac/drawingml/2011/main" xmlns:p="http://schemas.openxmlformats.org/presentationml/2006/main" xmlns:r="http://schemas.openxmlformats.org/officeDocument/2006/relationships" xmlns:a="http://schemas.openxmlformats.org/drawingml/2006/main" xmlns="" val="1"/>
             </a:ext>
           </a:extLst>
         </p:spPr>
@@ -649,14 +646,14 @@
           <a:noFill/>
           <a:extLst>
             <a:ext uri="{909E8E84-426E-40dd-AFC4-6F175D3DCCD1}">
-              <a14:hiddenFill xmlns:a14="http://schemas.microsoft.com/office/drawing/2010/main">
+              <a14:hiddenFill xmlns:a14="http://schemas.microsoft.com/office/drawing/2010/main" xmlns:p="http://schemas.openxmlformats.org/presentationml/2006/main" xmlns:r="http://schemas.openxmlformats.org/officeDocument/2006/relationships" xmlns:a="http://schemas.openxmlformats.org/drawingml/2006/main" xmlns="">
                 <a:solidFill>
                   <a:srgbClr val="FFFFFF"/>
                 </a:solidFill>
               </a14:hiddenFill>
             </a:ext>
             <a:ext uri="{91240B29-F687-4f45-9708-019B960494DF}">
-              <a14:hiddenLine xmlns:a14="http://schemas.microsoft.com/office/drawing/2010/main" w="9525">
+              <a14:hiddenLine xmlns:a14="http://schemas.microsoft.com/office/drawing/2010/main" xmlns:p="http://schemas.openxmlformats.org/presentationml/2006/main" xmlns:r="http://schemas.openxmlformats.org/officeDocument/2006/relationships" xmlns:a="http://schemas.openxmlformats.org/drawingml/2006/main" xmlns="" w="9525">
                 <a:solidFill>
                   <a:srgbClr val="000000"/>
                 </a:solidFill>
@@ -666,7 +663,7 @@
               </a14:hiddenLine>
             </a:ext>
             <a:ext uri="{FAA26D3D-D897-4be2-8F04-BA451C77F1D7}">
-              <ma14:placeholderFlag xmlns:ma14="http://schemas.microsoft.com/office/mac/drawingml/2011/main" val="1"/>
+              <ma14:placeholderFlag xmlns:ma14="http://schemas.microsoft.com/office/mac/drawingml/2011/main" xmlns:p="http://schemas.openxmlformats.org/presentationml/2006/main" xmlns:r="http://schemas.openxmlformats.org/officeDocument/2006/relationships" xmlns:a="http://schemas.openxmlformats.org/drawingml/2006/main" xmlns="" val="1"/>
             </a:ext>
           </a:extLst>
         </p:spPr>
@@ -693,7 +690,7 @@
 </file>
 
 <file path=ppt/notesSlides/notesSlide3.xml><?xml version="1.0" encoding="utf-8"?>
-<p:notes xmlns:a="http://schemas.openxmlformats.org/drawingml/2006/main" xmlns:r="http://schemas.openxmlformats.org/officeDocument/2006/relationships" xmlns:p="http://schemas.openxmlformats.org/presentationml/2006/main">
+<p:notes xmlns:a="http://schemas.openxmlformats.org/drawingml/2006/main" xmlns:r="http://schemas.openxmlformats.org/officeDocument/2006/relationships" xmlns:mc="http://schemas.openxmlformats.org/markup-compatibility/2006" xmlns:mv="urn:schemas-microsoft-com:mac:vml" xmlns:p="http://schemas.openxmlformats.org/presentationml/2006/main" mc:Ignorable="mv" mc:PreserveAttributes="mv:*">
   <p:cSld>
     <p:spTree>
       <p:nvGrpSpPr>
@@ -731,14 +728,14 @@
           </a:ln>
           <a:extLst>
             <a:ext uri="{909E8E84-426E-40dd-AFC4-6F175D3DCCD1}">
-              <a14:hiddenFill xmlns:a14="http://schemas.microsoft.com/office/drawing/2010/main">
+              <a14:hiddenFill xmlns:a14="http://schemas.microsoft.com/office/drawing/2010/main" xmlns:p="http://schemas.openxmlformats.org/presentationml/2006/main" xmlns:r="http://schemas.openxmlformats.org/officeDocument/2006/relationships" xmlns:a="http://schemas.openxmlformats.org/drawingml/2006/main" xmlns="">
                 <a:solidFill>
                   <a:srgbClr val="FFFFFF"/>
                 </a:solidFill>
               </a14:hiddenFill>
             </a:ext>
             <a:ext uri="{FAA26D3D-D897-4be2-8F04-BA451C77F1D7}">
-              <ma14:placeholderFlag xmlns:ma14="http://schemas.microsoft.com/office/mac/drawingml/2011/main" val="1"/>
+              <ma14:placeholderFlag xmlns:ma14="http://schemas.microsoft.com/office/mac/drawingml/2011/main" xmlns:p="http://schemas.openxmlformats.org/presentationml/2006/main" xmlns:r="http://schemas.openxmlformats.org/officeDocument/2006/relationships" xmlns:a="http://schemas.openxmlformats.org/drawingml/2006/main" xmlns="" val="1"/>
             </a:ext>
           </a:extLst>
         </p:spPr>
@@ -757,14 +754,14 @@
           <a:noFill/>
           <a:extLst>
             <a:ext uri="{909E8E84-426E-40dd-AFC4-6F175D3DCCD1}">
-              <a14:hiddenFill xmlns:a14="http://schemas.microsoft.com/office/drawing/2010/main">
+              <a14:hiddenFill xmlns:a14="http://schemas.microsoft.com/office/drawing/2010/main" xmlns:p="http://schemas.openxmlformats.org/presentationml/2006/main" xmlns:r="http://schemas.openxmlformats.org/officeDocument/2006/relationships" xmlns:a="http://schemas.openxmlformats.org/drawingml/2006/main" xmlns="">
                 <a:solidFill>
                   <a:srgbClr val="FFFFFF"/>
                 </a:solidFill>
               </a14:hiddenFill>
             </a:ext>
             <a:ext uri="{91240B29-F687-4f45-9708-019B960494DF}">
-              <a14:hiddenLine xmlns:a14="http://schemas.microsoft.com/office/drawing/2010/main" w="9525">
+              <a14:hiddenLine xmlns:a14="http://schemas.microsoft.com/office/drawing/2010/main" xmlns:p="http://schemas.openxmlformats.org/presentationml/2006/main" xmlns:r="http://schemas.openxmlformats.org/officeDocument/2006/relationships" xmlns:a="http://schemas.openxmlformats.org/drawingml/2006/main" xmlns="" w="9525">
                 <a:solidFill>
                   <a:srgbClr val="000000"/>
                 </a:solidFill>
@@ -774,7 +771,7 @@
               </a14:hiddenLine>
             </a:ext>
             <a:ext uri="{FAA26D3D-D897-4be2-8F04-BA451C77F1D7}">
-              <ma14:placeholderFlag xmlns:ma14="http://schemas.microsoft.com/office/mac/drawingml/2011/main" val="1"/>
+              <ma14:placeholderFlag xmlns:ma14="http://schemas.microsoft.com/office/mac/drawingml/2011/main" xmlns:p="http://schemas.openxmlformats.org/presentationml/2006/main" xmlns:r="http://schemas.openxmlformats.org/officeDocument/2006/relationships" xmlns:a="http://schemas.openxmlformats.org/drawingml/2006/main" xmlns="" val="1"/>
             </a:ext>
           </a:extLst>
         </p:spPr>
@@ -801,7 +798,7 @@
 </file>
 
 <file path=ppt/notesSlides/notesSlide4.xml><?xml version="1.0" encoding="utf-8"?>
-<p:notes xmlns:a="http://schemas.openxmlformats.org/drawingml/2006/main" xmlns:r="http://schemas.openxmlformats.org/officeDocument/2006/relationships" xmlns:p="http://schemas.openxmlformats.org/presentationml/2006/main">
+<p:notes xmlns:a="http://schemas.openxmlformats.org/drawingml/2006/main" xmlns:r="http://schemas.openxmlformats.org/officeDocument/2006/relationships" xmlns:mc="http://schemas.openxmlformats.org/markup-compatibility/2006" xmlns:mv="urn:schemas-microsoft-com:mac:vml" xmlns:p="http://schemas.openxmlformats.org/presentationml/2006/main" mc:Ignorable="mv" mc:PreserveAttributes="mv:*">
   <p:cSld>
     <p:spTree>
       <p:nvGrpSpPr>
@@ -819,65 +816,91 @@
       </p:grpSpPr>
       <p:sp>
         <p:nvSpPr>
-          <p:cNvPr id="2" name="Slide Image Placeholder 1"/>
-          <p:cNvSpPr>
-            <a:spLocks noGrp="1" noRot="1" noChangeAspect="1"/>
+          <p:cNvPr id="304129" name="Rectangle 7"/>
+          <p:cNvSpPr txBox="1">
+            <a:spLocks noGrp="1" noChangeArrowheads="1"/>
+          </p:cNvSpPr>
+          <p:nvPr/>
+        </p:nvSpPr>
+        <p:spPr bwMode="auto">
+          <a:xfrm>
+            <a:off x="3886200" y="8686489"/>
+            <a:ext cx="2971800" cy="457512"/>
+          </a:xfrm>
+          <a:prstGeom prst="rect">
+            <a:avLst/>
+          </a:prstGeom>
+          <a:noFill/>
+          <a:ln>
+            <a:miter lim="800000"/>
+            <a:headEnd/>
+            <a:tailEnd/>
+          </a:ln>
+        </p:spPr>
+        <p:txBody>
+          <a:bodyPr anchor="b"/>
+          <a:lstStyle/>
+          <a:p>
+            <a:pPr algn="r" eaLnBrk="0" hangingPunct="0">
+              <a:defRPr/>
+            </a:pPr>
+            <a:fld id="{5639B2D1-4F62-47BF-B141-83C0868A9AB5}" type="slidenum">
+              <a:rPr lang="en-US" sz="1200">
+                <a:ea typeface="ＭＳ Ｐゴシック" pitchFamily="34" charset="-128"/>
+                <a:cs typeface="+mn-cs"/>
+              </a:rPr>
+              <a:pPr algn="r" eaLnBrk="0" hangingPunct="0">
+                <a:defRPr/>
+              </a:pPr>
+              <a:t>4</a:t>
+            </a:fld>
+            <a:endParaRPr lang="en-US" sz="1200" dirty="0">
+              <a:ea typeface="ＭＳ Ｐゴシック" pitchFamily="34" charset="-128"/>
+              <a:cs typeface="+mn-cs"/>
+            </a:endParaRPr>
+          </a:p>
+        </p:txBody>
+      </p:sp>
+      <p:sp>
+        <p:nvSpPr>
+          <p:cNvPr id="97282" name="Rectangle 2"/>
+          <p:cNvSpPr>
+            <a:spLocks noGrp="1" noRot="1" noChangeAspect="1" noChangeArrowheads="1" noTextEdit="1"/>
           </p:cNvSpPr>
           <p:nvPr>
             <p:ph type="sldImg"/>
           </p:nvPr>
         </p:nvSpPr>
-        <p:spPr/>
-      </p:sp>
-      <p:sp>
-        <p:nvSpPr>
-          <p:cNvPr id="3" name="Notes Placeholder 2"/>
-          <p:cNvSpPr>
-            <a:spLocks noGrp="1"/>
+        <p:spPr>
+          <a:ln/>
+        </p:spPr>
+      </p:sp>
+      <p:sp>
+        <p:nvSpPr>
+          <p:cNvPr id="97283" name="Rectangle 3"/>
+          <p:cNvSpPr>
+            <a:spLocks noGrp="1" noChangeArrowheads="1"/>
           </p:cNvSpPr>
           <p:nvPr>
             <p:ph type="body" idx="1"/>
           </p:nvPr>
         </p:nvSpPr>
-        <p:spPr/>
+        <p:spPr>
+          <a:noFill/>
+          <a:ln/>
+        </p:spPr>
         <p:txBody>
           <a:bodyPr/>
           <a:lstStyle/>
           <a:p>
-            <a:endParaRPr lang="en-US"/>
-          </a:p>
-        </p:txBody>
-      </p:sp>
-      <p:sp>
-        <p:nvSpPr>
-          <p:cNvPr id="4" name="Slide Number Placeholder 3"/>
-          <p:cNvSpPr>
-            <a:spLocks noGrp="1"/>
-          </p:cNvSpPr>
-          <p:nvPr>
-            <p:ph type="sldNum" sz="quarter" idx="10"/>
-          </p:nvPr>
-        </p:nvSpPr>
-        <p:spPr/>
-        <p:txBody>
-          <a:bodyPr/>
-          <a:lstStyle/>
-          <a:p>
-            <a:fld id="{3560C2FB-C494-1A46-A471-884A4E75440F}" type="slidenum">
-              <a:rPr lang="en-US" smtClean="0"/>
-              <a:pPr/>
-              <a:t>4</a:t>
-            </a:fld>
-            <a:endParaRPr lang="en-US" dirty="0"/>
+            <a:pPr eaLnBrk="1" hangingPunct="1"/>
+            <a:endParaRPr lang="en-US" dirty="0" smtClean="0">
+              <a:ea typeface="ＭＳ Ｐゴシック"/>
+            </a:endParaRPr>
           </a:p>
         </p:txBody>
       </p:sp>
     </p:spTree>
-    <p:extLst>
-      <p:ext uri="{BB962C8B-B14F-4D97-AF65-F5344CB8AC3E}">
-        <p14:creationId xmlns:p14="http://schemas.microsoft.com/office/powerpoint/2010/main" val="963676054"/>
-      </p:ext>
-    </p:extLst>
   </p:cSld>
   <p:clrMapOvr>
     <a:masterClrMapping/>
@@ -886,7 +909,7 @@
 </file>
 
 <file path=ppt/notesSlides/notesSlide5.xml><?xml version="1.0" encoding="utf-8"?>
-<p:notes xmlns:a="http://schemas.openxmlformats.org/drawingml/2006/main" xmlns:r="http://schemas.openxmlformats.org/officeDocument/2006/relationships" xmlns:p="http://schemas.openxmlformats.org/presentationml/2006/main">
+<p:notes xmlns:a="http://schemas.openxmlformats.org/drawingml/2006/main" xmlns:r="http://schemas.openxmlformats.org/officeDocument/2006/relationships" xmlns:mc="http://schemas.openxmlformats.org/markup-compatibility/2006" xmlns:mv="urn:schemas-microsoft-com:mac:vml" xmlns:p="http://schemas.openxmlformats.org/presentationml/2006/main" mc:Ignorable="mv" mc:PreserveAttributes="mv:*">
   <p:cSld>
     <p:spTree>
       <p:nvGrpSpPr>
@@ -960,262 +983,7 @@
     </p:spTree>
     <p:extLst>
       <p:ext uri="{BB962C8B-B14F-4D97-AF65-F5344CB8AC3E}">
-        <p14:creationId xmlns:p14="http://schemas.microsoft.com/office/powerpoint/2010/main" val="963676054"/>
-      </p:ext>
-    </p:extLst>
-  </p:cSld>
-  <p:clrMapOvr>
-    <a:masterClrMapping/>
-  </p:clrMapOvr>
-</p:notes>
-</file>
-
-<file path=ppt/notesSlides/notesSlide6.xml><?xml version="1.0" encoding="utf-8"?>
-<p:notes xmlns:a="http://schemas.openxmlformats.org/drawingml/2006/main" xmlns:r="http://schemas.openxmlformats.org/officeDocument/2006/relationships" xmlns:p="http://schemas.openxmlformats.org/presentationml/2006/main">
-  <p:cSld>
-    <p:spTree>
-      <p:nvGrpSpPr>
-        <p:cNvPr id="1" name=""/>
-        <p:cNvGrpSpPr/>
-        <p:nvPr/>
-      </p:nvGrpSpPr>
-      <p:grpSpPr>
-        <a:xfrm>
-          <a:off x="0" y="0"/>
-          <a:ext cx="0" cy="0"/>
-          <a:chOff x="0" y="0"/>
-          <a:chExt cx="0" cy="0"/>
-        </a:xfrm>
-      </p:grpSpPr>
-      <p:sp>
-        <p:nvSpPr>
-          <p:cNvPr id="2" name="Slide Image Placeholder 1"/>
-          <p:cNvSpPr>
-            <a:spLocks noGrp="1" noRot="1" noChangeAspect="1"/>
-          </p:cNvSpPr>
-          <p:nvPr>
-            <p:ph type="sldImg"/>
-          </p:nvPr>
-        </p:nvSpPr>
-        <p:spPr/>
-      </p:sp>
-      <p:sp>
-        <p:nvSpPr>
-          <p:cNvPr id="3" name="Notes Placeholder 2"/>
-          <p:cNvSpPr>
-            <a:spLocks noGrp="1"/>
-          </p:cNvSpPr>
-          <p:nvPr>
-            <p:ph type="body" idx="1"/>
-          </p:nvPr>
-        </p:nvSpPr>
-        <p:spPr/>
-        <p:txBody>
-          <a:bodyPr/>
-          <a:lstStyle/>
-          <a:p>
-            <a:endParaRPr lang="en-US"/>
-          </a:p>
-        </p:txBody>
-      </p:sp>
-      <p:sp>
-        <p:nvSpPr>
-          <p:cNvPr id="4" name="Slide Number Placeholder 3"/>
-          <p:cNvSpPr>
-            <a:spLocks noGrp="1"/>
-          </p:cNvSpPr>
-          <p:nvPr>
-            <p:ph type="sldNum" sz="quarter" idx="10"/>
-          </p:nvPr>
-        </p:nvSpPr>
-        <p:spPr/>
-        <p:txBody>
-          <a:bodyPr/>
-          <a:lstStyle/>
-          <a:p>
-            <a:fld id="{3560C2FB-C494-1A46-A471-884A4E75440F}" type="slidenum">
-              <a:rPr lang="en-US" smtClean="0"/>
-              <a:pPr/>
-              <a:t>6</a:t>
-            </a:fld>
-            <a:endParaRPr lang="en-US" dirty="0"/>
-          </a:p>
-        </p:txBody>
-      </p:sp>
-    </p:spTree>
-    <p:extLst>
-      <p:ext uri="{BB962C8B-B14F-4D97-AF65-F5344CB8AC3E}">
-        <p14:creationId xmlns:p14="http://schemas.microsoft.com/office/powerpoint/2010/main" val="963676054"/>
-      </p:ext>
-    </p:extLst>
-  </p:cSld>
-  <p:clrMapOvr>
-    <a:masterClrMapping/>
-  </p:clrMapOvr>
-</p:notes>
-</file>
-
-<file path=ppt/notesSlides/notesSlide7.xml><?xml version="1.0" encoding="utf-8"?>
-<p:notes xmlns:a="http://schemas.openxmlformats.org/drawingml/2006/main" xmlns:r="http://schemas.openxmlformats.org/officeDocument/2006/relationships" xmlns:p="http://schemas.openxmlformats.org/presentationml/2006/main">
-  <p:cSld>
-    <p:spTree>
-      <p:nvGrpSpPr>
-        <p:cNvPr id="1" name=""/>
-        <p:cNvGrpSpPr/>
-        <p:nvPr/>
-      </p:nvGrpSpPr>
-      <p:grpSpPr>
-        <a:xfrm>
-          <a:off x="0" y="0"/>
-          <a:ext cx="0" cy="0"/>
-          <a:chOff x="0" y="0"/>
-          <a:chExt cx="0" cy="0"/>
-        </a:xfrm>
-      </p:grpSpPr>
-      <p:sp>
-        <p:nvSpPr>
-          <p:cNvPr id="2" name="Slide Image Placeholder 1"/>
-          <p:cNvSpPr>
-            <a:spLocks noGrp="1" noRot="1" noChangeAspect="1"/>
-          </p:cNvSpPr>
-          <p:nvPr>
-            <p:ph type="sldImg"/>
-          </p:nvPr>
-        </p:nvSpPr>
-        <p:spPr/>
-      </p:sp>
-      <p:sp>
-        <p:nvSpPr>
-          <p:cNvPr id="3" name="Notes Placeholder 2"/>
-          <p:cNvSpPr>
-            <a:spLocks noGrp="1"/>
-          </p:cNvSpPr>
-          <p:nvPr>
-            <p:ph type="body" idx="1"/>
-          </p:nvPr>
-        </p:nvSpPr>
-        <p:spPr/>
-        <p:txBody>
-          <a:bodyPr/>
-          <a:lstStyle/>
-          <a:p>
-            <a:endParaRPr lang="en-US"/>
-          </a:p>
-        </p:txBody>
-      </p:sp>
-      <p:sp>
-        <p:nvSpPr>
-          <p:cNvPr id="4" name="Slide Number Placeholder 3"/>
-          <p:cNvSpPr>
-            <a:spLocks noGrp="1"/>
-          </p:cNvSpPr>
-          <p:nvPr>
-            <p:ph type="sldNum" sz="quarter" idx="10"/>
-          </p:nvPr>
-        </p:nvSpPr>
-        <p:spPr/>
-        <p:txBody>
-          <a:bodyPr/>
-          <a:lstStyle/>
-          <a:p>
-            <a:fld id="{3560C2FB-C494-1A46-A471-884A4E75440F}" type="slidenum">
-              <a:rPr lang="en-US" smtClean="0"/>
-              <a:pPr/>
-              <a:t>7</a:t>
-            </a:fld>
-            <a:endParaRPr lang="en-US" dirty="0"/>
-          </a:p>
-        </p:txBody>
-      </p:sp>
-    </p:spTree>
-    <p:extLst>
-      <p:ext uri="{BB962C8B-B14F-4D97-AF65-F5344CB8AC3E}">
-        <p14:creationId xmlns:p14="http://schemas.microsoft.com/office/powerpoint/2010/main" val="963676054"/>
-      </p:ext>
-    </p:extLst>
-  </p:cSld>
-  <p:clrMapOvr>
-    <a:masterClrMapping/>
-  </p:clrMapOvr>
-</p:notes>
-</file>
-
-<file path=ppt/notesSlides/notesSlide8.xml><?xml version="1.0" encoding="utf-8"?>
-<p:notes xmlns:a="http://schemas.openxmlformats.org/drawingml/2006/main" xmlns:r="http://schemas.openxmlformats.org/officeDocument/2006/relationships" xmlns:p="http://schemas.openxmlformats.org/presentationml/2006/main">
-  <p:cSld>
-    <p:spTree>
-      <p:nvGrpSpPr>
-        <p:cNvPr id="1" name=""/>
-        <p:cNvGrpSpPr/>
-        <p:nvPr/>
-      </p:nvGrpSpPr>
-      <p:grpSpPr>
-        <a:xfrm>
-          <a:off x="0" y="0"/>
-          <a:ext cx="0" cy="0"/>
-          <a:chOff x="0" y="0"/>
-          <a:chExt cx="0" cy="0"/>
-        </a:xfrm>
-      </p:grpSpPr>
-      <p:sp>
-        <p:nvSpPr>
-          <p:cNvPr id="2" name="Slide Image Placeholder 1"/>
-          <p:cNvSpPr>
-            <a:spLocks noGrp="1" noRot="1" noChangeAspect="1"/>
-          </p:cNvSpPr>
-          <p:nvPr>
-            <p:ph type="sldImg"/>
-          </p:nvPr>
-        </p:nvSpPr>
-        <p:spPr/>
-      </p:sp>
-      <p:sp>
-        <p:nvSpPr>
-          <p:cNvPr id="3" name="Notes Placeholder 2"/>
-          <p:cNvSpPr>
-            <a:spLocks noGrp="1"/>
-          </p:cNvSpPr>
-          <p:nvPr>
-            <p:ph type="body" idx="1"/>
-          </p:nvPr>
-        </p:nvSpPr>
-        <p:spPr/>
-        <p:txBody>
-          <a:bodyPr/>
-          <a:lstStyle/>
-          <a:p>
-            <a:endParaRPr lang="en-US"/>
-          </a:p>
-        </p:txBody>
-      </p:sp>
-      <p:sp>
-        <p:nvSpPr>
-          <p:cNvPr id="4" name="Slide Number Placeholder 3"/>
-          <p:cNvSpPr>
-            <a:spLocks noGrp="1"/>
-          </p:cNvSpPr>
-          <p:nvPr>
-            <p:ph type="sldNum" sz="quarter" idx="10"/>
-          </p:nvPr>
-        </p:nvSpPr>
-        <p:spPr/>
-        <p:txBody>
-          <a:bodyPr/>
-          <a:lstStyle/>
-          <a:p>
-            <a:fld id="{3560C2FB-C494-1A46-A471-884A4E75440F}" type="slidenum">
-              <a:rPr lang="en-US" smtClean="0"/>
-              <a:pPr/>
-              <a:t>8</a:t>
-            </a:fld>
-            <a:endParaRPr lang="en-US" dirty="0"/>
-          </a:p>
-        </p:txBody>
-      </p:sp>
-    </p:spTree>
-    <p:extLst>
-      <p:ext uri="{BB962C8B-B14F-4D97-AF65-F5344CB8AC3E}">
-        <p14:creationId xmlns:p14="http://schemas.microsoft.com/office/powerpoint/2010/main" val="1443086944"/>
+        <p14:creationId xmlns:p14="http://schemas.microsoft.com/office/powerpoint/2010/main" xmlns:p="http://schemas.openxmlformats.org/presentationml/2006/main" xmlns:r="http://schemas.openxmlformats.org/officeDocument/2006/relationships" xmlns:a="http://schemas.openxmlformats.org/drawingml/2006/main" xmlns="" val="1443086944"/>
       </p:ext>
     </p:extLst>
   </p:cSld>
@@ -1226,7 +994,7 @@
 </file>
 
 <file path=ppt/slideLayouts/slideLayout1.xml><?xml version="1.0" encoding="utf-8"?>
-<p:sldLayout xmlns:a="http://schemas.openxmlformats.org/drawingml/2006/main" xmlns:r="http://schemas.openxmlformats.org/officeDocument/2006/relationships" xmlns:p="http://schemas.openxmlformats.org/presentationml/2006/main" type="title" preserve="1">
+<p:sldLayout xmlns:a="http://schemas.openxmlformats.org/drawingml/2006/main" xmlns:r="http://schemas.openxmlformats.org/officeDocument/2006/relationships" xmlns:mc="http://schemas.openxmlformats.org/markup-compatibility/2006" xmlns:mv="urn:schemas-microsoft-com:mac:vml" xmlns:p="http://schemas.openxmlformats.org/presentationml/2006/main" mc:Ignorable="mv" mc:PreserveAttributes="mv:*" type="title" preserve="1">
   <p:cSld name="Title Slide">
     <p:bg>
       <p:bgPr>
@@ -1450,7 +1218,7 @@
 </file>
 
 <file path=ppt/slideLayouts/slideLayout10.xml><?xml version="1.0" encoding="utf-8"?>
-<p:sldLayout xmlns:a="http://schemas.openxmlformats.org/drawingml/2006/main" xmlns:r="http://schemas.openxmlformats.org/officeDocument/2006/relationships" xmlns:p="http://schemas.openxmlformats.org/presentationml/2006/main" preserve="1" userDrawn="1">
+<p:sldLayout xmlns:a="http://schemas.openxmlformats.org/drawingml/2006/main" xmlns:r="http://schemas.openxmlformats.org/officeDocument/2006/relationships" xmlns:mc="http://schemas.openxmlformats.org/markup-compatibility/2006" xmlns:mv="urn:schemas-microsoft-com:mac:vml" xmlns:p="http://schemas.openxmlformats.org/presentationml/2006/main" mc:Ignorable="mv" mc:PreserveAttributes="mv:*" preserve="1" userDrawn="1">
   <p:cSld name="Impact Slide - Pink">
     <p:bg>
       <p:bgPr>
@@ -1523,7 +1291,7 @@
 </file>
 
 <file path=ppt/slideLayouts/slideLayout11.xml><?xml version="1.0" encoding="utf-8"?>
-<p:sldLayout xmlns:a="http://schemas.openxmlformats.org/drawingml/2006/main" xmlns:r="http://schemas.openxmlformats.org/officeDocument/2006/relationships" xmlns:p="http://schemas.openxmlformats.org/presentationml/2006/main" preserve="1" userDrawn="1">
+<p:sldLayout xmlns:a="http://schemas.openxmlformats.org/drawingml/2006/main" xmlns:r="http://schemas.openxmlformats.org/officeDocument/2006/relationships" xmlns:mc="http://schemas.openxmlformats.org/markup-compatibility/2006" xmlns:mv="urn:schemas-microsoft-com:mac:vml" xmlns:p="http://schemas.openxmlformats.org/presentationml/2006/main" mc:Ignorable="mv" mc:PreserveAttributes="mv:*" preserve="1" userDrawn="1">
   <p:cSld name="Quote Slide - Neutral">
     <p:bg>
       <p:bgPr>
@@ -1682,7 +1450,7 @@
 </file>
 
 <file path=ppt/slideLayouts/slideLayout12.xml><?xml version="1.0" encoding="utf-8"?>
-<p:sldLayout xmlns:a="http://schemas.openxmlformats.org/drawingml/2006/main" xmlns:r="http://schemas.openxmlformats.org/officeDocument/2006/relationships" xmlns:p="http://schemas.openxmlformats.org/presentationml/2006/main" preserve="1" userDrawn="1">
+<p:sldLayout xmlns:a="http://schemas.openxmlformats.org/drawingml/2006/main" xmlns:r="http://schemas.openxmlformats.org/officeDocument/2006/relationships" xmlns:mc="http://schemas.openxmlformats.org/markup-compatibility/2006" xmlns:mv="urn:schemas-microsoft-com:mac:vml" xmlns:p="http://schemas.openxmlformats.org/presentationml/2006/main" mc:Ignorable="mv" mc:PreserveAttributes="mv:*" preserve="1" userDrawn="1">
   <p:cSld name="Quote Slide - Teal">
     <p:bg>
       <p:bgPr>
@@ -1835,7 +1603,7 @@
 </file>
 
 <file path=ppt/slideLayouts/slideLayout13.xml><?xml version="1.0" encoding="utf-8"?>
-<p:sldLayout xmlns:a="http://schemas.openxmlformats.org/drawingml/2006/main" xmlns:r="http://schemas.openxmlformats.org/officeDocument/2006/relationships" xmlns:p="http://schemas.openxmlformats.org/presentationml/2006/main" preserve="1" userDrawn="1">
+<p:sldLayout xmlns:a="http://schemas.openxmlformats.org/drawingml/2006/main" xmlns:r="http://schemas.openxmlformats.org/officeDocument/2006/relationships" xmlns:mc="http://schemas.openxmlformats.org/markup-compatibility/2006" xmlns:mv="urn:schemas-microsoft-com:mac:vml" xmlns:p="http://schemas.openxmlformats.org/presentationml/2006/main" mc:Ignorable="mv" mc:PreserveAttributes="mv:*" preserve="1" userDrawn="1">
   <p:cSld name="Quote Slide - Green">
     <p:bg>
       <p:bgPr>
@@ -1988,7 +1756,7 @@
 </file>
 
 <file path=ppt/slideLayouts/slideLayout14.xml><?xml version="1.0" encoding="utf-8"?>
-<p:sldLayout xmlns:a="http://schemas.openxmlformats.org/drawingml/2006/main" xmlns:r="http://schemas.openxmlformats.org/officeDocument/2006/relationships" xmlns:p="http://schemas.openxmlformats.org/presentationml/2006/main" preserve="1" userDrawn="1">
+<p:sldLayout xmlns:a="http://schemas.openxmlformats.org/drawingml/2006/main" xmlns:r="http://schemas.openxmlformats.org/officeDocument/2006/relationships" xmlns:mc="http://schemas.openxmlformats.org/markup-compatibility/2006" xmlns:mv="urn:schemas-microsoft-com:mac:vml" xmlns:p="http://schemas.openxmlformats.org/presentationml/2006/main" mc:Ignorable="mv" mc:PreserveAttributes="mv:*" preserve="1" userDrawn="1">
   <p:cSld name="Orange Quote Slide">
     <p:bg>
       <p:bgPr>
@@ -2141,7 +1909,7 @@
 </file>
 
 <file path=ppt/slideLayouts/slideLayout15.xml><?xml version="1.0" encoding="utf-8"?>
-<p:sldLayout xmlns:a="http://schemas.openxmlformats.org/drawingml/2006/main" xmlns:r="http://schemas.openxmlformats.org/officeDocument/2006/relationships" xmlns:p="http://schemas.openxmlformats.org/presentationml/2006/main" preserve="1" userDrawn="1">
+<p:sldLayout xmlns:a="http://schemas.openxmlformats.org/drawingml/2006/main" xmlns:r="http://schemas.openxmlformats.org/officeDocument/2006/relationships" xmlns:mc="http://schemas.openxmlformats.org/markup-compatibility/2006" xmlns:mv="urn:schemas-microsoft-com:mac:vml" xmlns:p="http://schemas.openxmlformats.org/presentationml/2006/main" mc:Ignorable="mv" mc:PreserveAttributes="mv:*" preserve="1" userDrawn="1">
   <p:cSld name="Quote Slide - Pink">
     <p:bg>
       <p:bgPr>
@@ -2294,7 +2062,7 @@
 </file>
 
 <file path=ppt/slideLayouts/slideLayout16.xml><?xml version="1.0" encoding="utf-8"?>
-<p:sldLayout xmlns:a="http://schemas.openxmlformats.org/drawingml/2006/main" xmlns:r="http://schemas.openxmlformats.org/officeDocument/2006/relationships" xmlns:p="http://schemas.openxmlformats.org/presentationml/2006/main" preserve="1" userDrawn="1">
+<p:sldLayout xmlns:a="http://schemas.openxmlformats.org/drawingml/2006/main" xmlns:r="http://schemas.openxmlformats.org/officeDocument/2006/relationships" xmlns:mc="http://schemas.openxmlformats.org/markup-compatibility/2006" xmlns:mv="urn:schemas-microsoft-com:mac:vml" xmlns:p="http://schemas.openxmlformats.org/presentationml/2006/main" mc:Ignorable="mv" mc:PreserveAttributes="mv:*" preserve="1" userDrawn="1">
   <p:cSld name="Thank You - Teal">
     <p:bg>
       <p:bgPr>
@@ -2425,7 +2193,7 @@
 </file>
 
 <file path=ppt/slideLayouts/slideLayout17.xml><?xml version="1.0" encoding="utf-8"?>
-<p:sldLayout xmlns:a="http://schemas.openxmlformats.org/drawingml/2006/main" xmlns:r="http://schemas.openxmlformats.org/officeDocument/2006/relationships" xmlns:p="http://schemas.openxmlformats.org/presentationml/2006/main" preserve="1" userDrawn="1">
+<p:sldLayout xmlns:a="http://schemas.openxmlformats.org/drawingml/2006/main" xmlns:r="http://schemas.openxmlformats.org/officeDocument/2006/relationships" xmlns:mc="http://schemas.openxmlformats.org/markup-compatibility/2006" xmlns:mv="urn:schemas-microsoft-com:mac:vml" xmlns:p="http://schemas.openxmlformats.org/presentationml/2006/main" mc:Ignorable="mv" mc:PreserveAttributes="mv:*" preserve="1" userDrawn="1">
   <p:cSld name="Thank You - Green">
     <p:bg>
       <p:bgPr>
@@ -2556,7 +2324,7 @@
 </file>
 
 <file path=ppt/slideLayouts/slideLayout18.xml><?xml version="1.0" encoding="utf-8"?>
-<p:sldLayout xmlns:a="http://schemas.openxmlformats.org/drawingml/2006/main" xmlns:r="http://schemas.openxmlformats.org/officeDocument/2006/relationships" xmlns:p="http://schemas.openxmlformats.org/presentationml/2006/main" userDrawn="1">
+<p:sldLayout xmlns:a="http://schemas.openxmlformats.org/drawingml/2006/main" xmlns:r="http://schemas.openxmlformats.org/officeDocument/2006/relationships" xmlns:mc="http://schemas.openxmlformats.org/markup-compatibility/2006" xmlns:mv="urn:schemas-microsoft-com:mac:vml" xmlns:p="http://schemas.openxmlformats.org/presentationml/2006/main" mc:Ignorable="mv" mc:PreserveAttributes="mv:*" userDrawn="1">
   <p:cSld name="Thank You - Orange">
     <p:bg>
       <p:bgPr>
@@ -2687,7 +2455,7 @@
 </file>
 
 <file path=ppt/slideLayouts/slideLayout19.xml><?xml version="1.0" encoding="utf-8"?>
-<p:sldLayout xmlns:a="http://schemas.openxmlformats.org/drawingml/2006/main" xmlns:r="http://schemas.openxmlformats.org/officeDocument/2006/relationships" xmlns:p="http://schemas.openxmlformats.org/presentationml/2006/main" userDrawn="1">
+<p:sldLayout xmlns:a="http://schemas.openxmlformats.org/drawingml/2006/main" xmlns:r="http://schemas.openxmlformats.org/officeDocument/2006/relationships" xmlns:mc="http://schemas.openxmlformats.org/markup-compatibility/2006" xmlns:mv="urn:schemas-microsoft-com:mac:vml" xmlns:p="http://schemas.openxmlformats.org/presentationml/2006/main" mc:Ignorable="mv" mc:PreserveAttributes="mv:*" userDrawn="1">
   <p:cSld name="Thank You - Pink">
     <p:bg>
       <p:bgPr>
@@ -2818,7 +2586,7 @@
 </file>
 
 <file path=ppt/slideLayouts/slideLayout2.xml><?xml version="1.0" encoding="utf-8"?>
-<p:sldLayout xmlns:a="http://schemas.openxmlformats.org/drawingml/2006/main" xmlns:r="http://schemas.openxmlformats.org/officeDocument/2006/relationships" xmlns:p="http://schemas.openxmlformats.org/presentationml/2006/main" preserve="1" userDrawn="1">
+<p:sldLayout xmlns:a="http://schemas.openxmlformats.org/drawingml/2006/main" xmlns:r="http://schemas.openxmlformats.org/officeDocument/2006/relationships" xmlns:mc="http://schemas.openxmlformats.org/markup-compatibility/2006" xmlns:mv="urn:schemas-microsoft-com:mac:vml" xmlns:p="http://schemas.openxmlformats.org/presentationml/2006/main" mc:Ignorable="mv" mc:PreserveAttributes="mv:*" preserve="1" userDrawn="1">
   <p:cSld name="Title and Single Element">
     <p:spTree>
       <p:nvGrpSpPr>
@@ -3149,7 +2917,7 @@
 </file>
 
 <file path=ppt/slideLayouts/slideLayout3.xml><?xml version="1.0" encoding="utf-8"?>
-<p:sldLayout xmlns:a="http://schemas.openxmlformats.org/drawingml/2006/main" xmlns:r="http://schemas.openxmlformats.org/officeDocument/2006/relationships" xmlns:p="http://schemas.openxmlformats.org/presentationml/2006/main" preserve="1" userDrawn="1">
+<p:sldLayout xmlns:a="http://schemas.openxmlformats.org/drawingml/2006/main" xmlns:r="http://schemas.openxmlformats.org/officeDocument/2006/relationships" xmlns:mc="http://schemas.openxmlformats.org/markup-compatibility/2006" xmlns:mv="urn:schemas-microsoft-com:mac:vml" xmlns:p="http://schemas.openxmlformats.org/presentationml/2006/main" mc:Ignorable="mv" mc:PreserveAttributes="mv:*" preserve="1" userDrawn="1">
   <p:cSld name="Title and Two Element">
     <p:spTree>
       <p:nvGrpSpPr>
@@ -3541,7 +3309,7 @@
 </file>
 
 <file path=ppt/slideLayouts/slideLayout4.xml><?xml version="1.0" encoding="utf-8"?>
-<p:sldLayout xmlns:a="http://schemas.openxmlformats.org/drawingml/2006/main" xmlns:r="http://schemas.openxmlformats.org/officeDocument/2006/relationships" xmlns:p="http://schemas.openxmlformats.org/presentationml/2006/main" preserve="1" userDrawn="1">
+<p:sldLayout xmlns:a="http://schemas.openxmlformats.org/drawingml/2006/main" xmlns:r="http://schemas.openxmlformats.org/officeDocument/2006/relationships" xmlns:mc="http://schemas.openxmlformats.org/markup-compatibility/2006" xmlns:mv="urn:schemas-microsoft-com:mac:vml" xmlns:p="http://schemas.openxmlformats.org/presentationml/2006/main" mc:Ignorable="mv" mc:PreserveAttributes="mv:*" preserve="1" userDrawn="1">
   <p:cSld name="Title Only and Blank">
     <p:spTree>
       <p:nvGrpSpPr>
@@ -3815,7 +3583,7 @@
 </file>
 
 <file path=ppt/slideLayouts/slideLayout5.xml><?xml version="1.0" encoding="utf-8"?>
-<p:sldLayout xmlns:a="http://schemas.openxmlformats.org/drawingml/2006/main" xmlns:r="http://schemas.openxmlformats.org/officeDocument/2006/relationships" xmlns:p="http://schemas.openxmlformats.org/presentationml/2006/main" userDrawn="1">
+<p:sldLayout xmlns:a="http://schemas.openxmlformats.org/drawingml/2006/main" xmlns:r="http://schemas.openxmlformats.org/officeDocument/2006/relationships" xmlns:mc="http://schemas.openxmlformats.org/markup-compatibility/2006" xmlns:mv="urn:schemas-microsoft-com:mac:vml" xmlns:p="http://schemas.openxmlformats.org/presentationml/2006/main" mc:Ignorable="mv" mc:PreserveAttributes="mv:*" userDrawn="1">
   <p:cSld name="Left Text and Right Image">
     <p:spTree>
       <p:nvGrpSpPr>
@@ -4176,7 +3944,7 @@
 </file>
 
 <file path=ppt/slideLayouts/slideLayout6.xml><?xml version="1.0" encoding="utf-8"?>
-<p:sldLayout xmlns:a="http://schemas.openxmlformats.org/drawingml/2006/main" xmlns:r="http://schemas.openxmlformats.org/officeDocument/2006/relationships" xmlns:p="http://schemas.openxmlformats.org/presentationml/2006/main" preserve="1" userDrawn="1">
+<p:sldLayout xmlns:a="http://schemas.openxmlformats.org/drawingml/2006/main" xmlns:r="http://schemas.openxmlformats.org/officeDocument/2006/relationships" xmlns:mc="http://schemas.openxmlformats.org/markup-compatibility/2006" xmlns:mv="urn:schemas-microsoft-com:mac:vml" xmlns:p="http://schemas.openxmlformats.org/presentationml/2006/main" mc:Ignorable="mv" mc:PreserveAttributes="mv:*" preserve="1" userDrawn="1">
   <p:cSld name="Left Image and Right Text">
     <p:spTree>
       <p:nvGrpSpPr>
@@ -4537,7 +4305,7 @@
 </file>
 
 <file path=ppt/slideLayouts/slideLayout7.xml><?xml version="1.0" encoding="utf-8"?>
-<p:sldLayout xmlns:a="http://schemas.openxmlformats.org/drawingml/2006/main" xmlns:r="http://schemas.openxmlformats.org/officeDocument/2006/relationships" xmlns:p="http://schemas.openxmlformats.org/presentationml/2006/main" preserve="1" userDrawn="1">
+<p:sldLayout xmlns:a="http://schemas.openxmlformats.org/drawingml/2006/main" xmlns:r="http://schemas.openxmlformats.org/officeDocument/2006/relationships" xmlns:mc="http://schemas.openxmlformats.org/markup-compatibility/2006" xmlns:mv="urn:schemas-microsoft-com:mac:vml" xmlns:p="http://schemas.openxmlformats.org/presentationml/2006/main" mc:Ignorable="mv" mc:PreserveAttributes="mv:*" preserve="1" userDrawn="1">
   <p:cSld name="Impact Slide - Teal">
     <p:bg>
       <p:bgPr>
@@ -4632,7 +4400,7 @@
 </file>
 
 <file path=ppt/slideLayouts/slideLayout8.xml><?xml version="1.0" encoding="utf-8"?>
-<p:sldLayout xmlns:a="http://schemas.openxmlformats.org/drawingml/2006/main" xmlns:r="http://schemas.openxmlformats.org/officeDocument/2006/relationships" xmlns:p="http://schemas.openxmlformats.org/presentationml/2006/main" preserve="1" userDrawn="1">
+<p:sldLayout xmlns:a="http://schemas.openxmlformats.org/drawingml/2006/main" xmlns:r="http://schemas.openxmlformats.org/officeDocument/2006/relationships" xmlns:mc="http://schemas.openxmlformats.org/markup-compatibility/2006" xmlns:mv="urn:schemas-microsoft-com:mac:vml" xmlns:p="http://schemas.openxmlformats.org/presentationml/2006/main" mc:Ignorable="mv" mc:PreserveAttributes="mv:*" preserve="1" userDrawn="1">
   <p:cSld name="Impact Slide - Green">
     <p:bg>
       <p:bgPr>
@@ -4727,7 +4495,7 @@
 </file>
 
 <file path=ppt/slideLayouts/slideLayout9.xml><?xml version="1.0" encoding="utf-8"?>
-<p:sldLayout xmlns:a="http://schemas.openxmlformats.org/drawingml/2006/main" xmlns:r="http://schemas.openxmlformats.org/officeDocument/2006/relationships" xmlns:p="http://schemas.openxmlformats.org/presentationml/2006/main" preserve="1" userDrawn="1">
+<p:sldLayout xmlns:a="http://schemas.openxmlformats.org/drawingml/2006/main" xmlns:r="http://schemas.openxmlformats.org/officeDocument/2006/relationships" xmlns:mc="http://schemas.openxmlformats.org/markup-compatibility/2006" xmlns:mv="urn:schemas-microsoft-com:mac:vml" xmlns:p="http://schemas.openxmlformats.org/presentationml/2006/main" mc:Ignorable="mv" mc:PreserveAttributes="mv:*" preserve="1" userDrawn="1">
   <p:cSld name="Impact Slide - Orange">
     <p:bg>
       <p:bgPr>
@@ -4822,7 +4590,7 @@
 </file>
 
 <file path=ppt/slideMasters/slideMaster1.xml><?xml version="1.0" encoding="utf-8"?>
-<p:sldMaster xmlns:a="http://schemas.openxmlformats.org/drawingml/2006/main" xmlns:r="http://schemas.openxmlformats.org/officeDocument/2006/relationships" xmlns:p="http://schemas.openxmlformats.org/presentationml/2006/main">
+<p:sldMaster xmlns:a="http://schemas.openxmlformats.org/drawingml/2006/main" xmlns:r="http://schemas.openxmlformats.org/officeDocument/2006/relationships" xmlns:mc="http://schemas.openxmlformats.org/markup-compatibility/2006" xmlns:mv="urn:schemas-microsoft-com:mac:vml" xmlns:p="http://schemas.openxmlformats.org/presentationml/2006/main" mc:Ignorable="mv" mc:PreserveAttributes="mv:*">
   <p:cSld>
     <p:bg>
       <p:bgPr>
@@ -5444,7 +5212,7 @@
 </file>
 
 <file path=ppt/slides/slide1.xml><?xml version="1.0" encoding="utf-8"?>
-<p:sld xmlns:a="http://schemas.openxmlformats.org/drawingml/2006/main" xmlns:r="http://schemas.openxmlformats.org/officeDocument/2006/relationships" xmlns:p="http://schemas.openxmlformats.org/presentationml/2006/main">
+<p:sld xmlns:a="http://schemas.openxmlformats.org/drawingml/2006/main" xmlns:r="http://schemas.openxmlformats.org/officeDocument/2006/relationships" xmlns:mc="http://schemas.openxmlformats.org/markup-compatibility/2006" xmlns:mv="urn:schemas-microsoft-com:mac:vml" xmlns:p="http://schemas.openxmlformats.org/presentationml/2006/main" mc:Ignorable="mv" mc:PreserveAttributes="mv:*">
   <p:cSld>
     <p:spTree>
       <p:nvGrpSpPr>
@@ -5524,20 +5292,20 @@
     </p:spTree>
     <p:extLst>
       <p:ext uri="{BB962C8B-B14F-4D97-AF65-F5344CB8AC3E}">
-        <p14:creationId xmlns:p14="http://schemas.microsoft.com/office/powerpoint/2010/main" val="2352184382"/>
+        <p14:creationId xmlns:p14="http://schemas.microsoft.com/office/powerpoint/2010/main" xmlns:p="http://schemas.openxmlformats.org/presentationml/2006/main" xmlns:r="http://schemas.openxmlformats.org/officeDocument/2006/relationships" xmlns:a="http://schemas.openxmlformats.org/drawingml/2006/main" xmlns="" val="2352184382"/>
       </p:ext>
     </p:extLst>
   </p:cSld>
   <p:clrMapOvr>
     <a:masterClrMapping/>
   </p:clrMapOvr>
-  <p:transition xmlns:p14="http://schemas.microsoft.com/office/powerpoint/2010/main" spd="med">
+  <p:transition spd="med">
     <p:fade/>
   </p:transition>
   <p:timing>
     <p:tnLst>
       <p:par>
-        <p:cTn xmlns:p14="http://schemas.microsoft.com/office/powerpoint/2010/main" id="1" dur="indefinite" restart="never" nodeType="tmRoot"/>
+        <p:cTn id="1" dur="indefinite" restart="never" nodeType="tmRoot"/>
       </p:par>
     </p:tnLst>
   </p:timing>
@@ -5545,7 +5313,7 @@
 </file>
 
 <file path=ppt/slides/slide2.xml><?xml version="1.0" encoding="utf-8"?>
-<p:sld xmlns:a="http://schemas.openxmlformats.org/drawingml/2006/main" xmlns:r="http://schemas.openxmlformats.org/officeDocument/2006/relationships" xmlns:p="http://schemas.openxmlformats.org/presentationml/2006/main">
+<p:sld xmlns:a="http://schemas.openxmlformats.org/drawingml/2006/main" xmlns:r="http://schemas.openxmlformats.org/officeDocument/2006/relationships" xmlns:mc="http://schemas.openxmlformats.org/markup-compatibility/2006" xmlns:mv="urn:schemas-microsoft-com:mac:vml" xmlns:p="http://schemas.openxmlformats.org/presentationml/2006/main" mc:Ignorable="mv" mc:PreserveAttributes="mv:*">
   <p:cSld>
     <p:spTree>
       <p:nvGrpSpPr>
@@ -5651,7 +5419,7 @@
     </p:spTree>
     <p:extLst>
       <p:ext uri="{BB962C8B-B14F-4D97-AF65-F5344CB8AC3E}">
-        <p14:creationId xmlns:p14="http://schemas.microsoft.com/office/powerpoint/2010/main" val="2138093764"/>
+        <p14:creationId xmlns:p14="http://schemas.microsoft.com/office/powerpoint/2010/main" xmlns:p="http://schemas.openxmlformats.org/presentationml/2006/main" xmlns:r="http://schemas.openxmlformats.org/officeDocument/2006/relationships" xmlns:a="http://schemas.openxmlformats.org/drawingml/2006/main" xmlns="" val="2138093764"/>
       </p:ext>
     </p:extLst>
   </p:cSld>
@@ -5661,7 +5429,7 @@
   <p:timing>
     <p:tnLst>
       <p:par>
-        <p:cTn xmlns:p14="http://schemas.microsoft.com/office/powerpoint/2010/main" id="1" dur="indefinite" restart="never" nodeType="tmRoot"/>
+        <p:cTn id="1" dur="indefinite" restart="never" nodeType="tmRoot"/>
       </p:par>
     </p:tnLst>
   </p:timing>
@@ -5669,7 +5437,7 @@
 </file>
 
 <file path=ppt/slides/slide3.xml><?xml version="1.0" encoding="utf-8"?>
-<p:sld xmlns:a="http://schemas.openxmlformats.org/drawingml/2006/main" xmlns:r="http://schemas.openxmlformats.org/officeDocument/2006/relationships" xmlns:p="http://schemas.openxmlformats.org/presentationml/2006/main">
+<p:sld xmlns:a="http://schemas.openxmlformats.org/drawingml/2006/main" xmlns:r="http://schemas.openxmlformats.org/officeDocument/2006/relationships" xmlns:mc="http://schemas.openxmlformats.org/markup-compatibility/2006" xmlns:mv="urn:schemas-microsoft-com:mac:vml" xmlns:p="http://schemas.openxmlformats.org/presentationml/2006/main" mc:Ignorable="mv" mc:PreserveAttributes="mv:*">
   <p:cSld>
     <p:spTree>
       <p:nvGrpSpPr>
@@ -5736,38 +5504,54 @@
           <a:lstStyle/>
           <a:p>
             <a:r>
-              <a:rPr lang="en-US" sz="3000">
+              <a:rPr lang="en-US" sz="3000" dirty="0" smtClean="0">
                 <a:latin typeface="Arial" charset="0"/>
                 <a:ea typeface="ＭＳ Ｐゴシック" charset="0"/>
               </a:rPr>
-              <a:t>in the JSON object</a:t>
+              <a:t>Errors can be caused by typos or bad user input</a:t>
+            </a:r>
+          </a:p>
+          <a:p>
+            <a:r>
+              <a:rPr lang="en-US" sz="3000" dirty="0" smtClean="0">
+                <a:latin typeface="Arial" charset="0"/>
+                <a:ea typeface="ＭＳ Ｐゴシック" charset="0"/>
+              </a:rPr>
+              <a:t>in </a:t>
+            </a:r>
+            <a:r>
+              <a:rPr lang="en-US" sz="3000" dirty="0">
+                <a:latin typeface="Arial" charset="0"/>
+                <a:ea typeface="ＭＳ Ｐゴシック" charset="0"/>
+              </a:rPr>
+              <a:t>the JSON object</a:t>
             </a:r>
           </a:p>
           <a:p>
             <a:pPr lvl="1"/>
             <a:r>
-              <a:rPr lang="ja-JP" altLang="en-US" sz="3000">
+              <a:rPr lang="ja-JP" altLang="en-US" sz="3000" dirty="0">
                 <a:latin typeface="Arial" charset="0"/>
                 <a:ea typeface="ＭＳ Ｐゴシック" charset="0"/>
               </a:rPr>
               <a:t>“</a:t>
             </a:r>
             <a:r>
-              <a:rPr lang="en-US" altLang="ja-JP" sz="3000">
+              <a:rPr lang="en-US" altLang="ja-JP" sz="3000" dirty="0">
                 <a:latin typeface="Arial" charset="0"/>
                 <a:ea typeface="ＭＳ Ｐゴシック" charset="0"/>
               </a:rPr>
               <a:t>error</a:t>
             </a:r>
             <a:r>
-              <a:rPr lang="ja-JP" altLang="en-US" sz="3000">
+              <a:rPr lang="ja-JP" altLang="en-US" sz="3000" dirty="0">
                 <a:latin typeface="Arial" charset="0"/>
                 <a:ea typeface="ＭＳ Ｐゴシック" charset="0"/>
               </a:rPr>
               <a:t>”</a:t>
             </a:r>
             <a:r>
-              <a:rPr lang="en-US" altLang="ja-JP" sz="3000">
+              <a:rPr lang="en-US" altLang="ja-JP" sz="3000" dirty="0">
                 <a:latin typeface="Arial" charset="0"/>
                 <a:ea typeface="ＭＳ Ｐゴシック" charset="0"/>
               </a:rPr>
@@ -5777,28 +5561,28 @@
           <a:p>
             <a:pPr lvl="1"/>
             <a:r>
-              <a:rPr lang="ja-JP" altLang="en-US" sz="3000">
+              <a:rPr lang="ja-JP" altLang="en-US" sz="3000" dirty="0">
                 <a:latin typeface="Arial" charset="0"/>
                 <a:ea typeface="ＭＳ Ｐゴシック" charset="0"/>
               </a:rPr>
               <a:t>“</a:t>
             </a:r>
             <a:r>
-              <a:rPr lang="en-US" altLang="ja-JP" sz="3000">
+              <a:rPr lang="en-US" altLang="ja-JP" sz="3000" dirty="0">
                 <a:latin typeface="Arial" charset="0"/>
                 <a:ea typeface="ＭＳ Ｐゴシック" charset="0"/>
               </a:rPr>
               <a:t>code</a:t>
             </a:r>
             <a:r>
-              <a:rPr lang="ja-JP" altLang="en-US" sz="3000">
+              <a:rPr lang="ja-JP" altLang="en-US" sz="3000" dirty="0">
                 <a:latin typeface="Arial" charset="0"/>
                 <a:ea typeface="ＭＳ Ｐゴシック" charset="0"/>
               </a:rPr>
               <a:t>”</a:t>
             </a:r>
             <a:r>
-              <a:rPr lang="en-US" altLang="ja-JP" sz="3000">
+              <a:rPr lang="en-US" altLang="ja-JP" sz="3000" dirty="0">
                 <a:latin typeface="Arial" charset="0"/>
                 <a:ea typeface="ＭＳ Ｐゴシック" charset="0"/>
               </a:rPr>
@@ -5807,32 +5591,46 @@
           </a:p>
           <a:p>
             <a:r>
-              <a:rPr lang="en-US" sz="3000">
+              <a:rPr lang="en-US" sz="3000" dirty="0">
                 <a:latin typeface="Arial" charset="0"/>
                 <a:ea typeface="ＭＳ Ｐゴシック" charset="0"/>
               </a:rPr>
               <a:t>error code table: </a:t>
             </a:r>
             <a:r>
-              <a:rPr lang="en-US" sz="3000">
+              <a:rPr lang="en-US" sz="3000" dirty="0">
                 <a:latin typeface="Arial" charset="0"/>
                 <a:ea typeface="ＭＳ Ｐゴシック" charset="0"/>
                 <a:hlinkClick r:id="rId3"/>
               </a:rPr>
               <a:t>http://support.brightcove.com/en/docs/media-api-error-message-reference</a:t>
             </a:r>
-            <a:endParaRPr lang="en-US" sz="3000">
+            <a:endParaRPr lang="en-US" sz="3000" dirty="0">
               <a:latin typeface="Arial" charset="0"/>
               <a:ea typeface="ＭＳ Ｐゴシック" charset="0"/>
             </a:endParaRPr>
           </a:p>
           <a:p>
             <a:r>
-              <a:rPr lang="en-US" sz="3000">
+              <a:rPr lang="en-US" sz="3000" dirty="0">
                 <a:latin typeface="Arial" charset="0"/>
                 <a:ea typeface="ＭＳ Ｐゴシック" charset="0"/>
               </a:rPr>
-              <a:t>{"error": "UNKNOWN_METHOD","code":301} </a:t>
+              <a:t>{"error":</a:t>
+            </a:r>
+            <a:r>
+              <a:rPr lang="en-US" sz="3000" dirty="0" smtClean="0">
+                <a:latin typeface="Arial" charset="0"/>
+                <a:ea typeface="ＭＳ Ｐゴシック" charset="0"/>
+              </a:rPr>
+              <a:t> ”One or more validation errors have occurred"</a:t>
+            </a:r>
+            <a:r>
+              <a:rPr lang="en-US" sz="3000" dirty="0">
+                <a:latin typeface="Arial" charset="0"/>
+                <a:ea typeface="ＭＳ Ｐゴシック" charset="0"/>
+              </a:rPr>
+              <a:t>,"code":301} </a:t>
             </a:r>
           </a:p>
         </p:txBody>
@@ -5840,7 +5638,7 @@
     </p:spTree>
     <p:extLst>
       <p:ext uri="{BB962C8B-B14F-4D97-AF65-F5344CB8AC3E}">
-        <p14:creationId xmlns:p14="http://schemas.microsoft.com/office/powerpoint/2010/main" val="1572432146"/>
+        <p14:creationId xmlns:p14="http://schemas.microsoft.com/office/powerpoint/2010/main" xmlns:p="http://schemas.openxmlformats.org/presentationml/2006/main" xmlns:r="http://schemas.openxmlformats.org/officeDocument/2006/relationships" xmlns:a="http://schemas.openxmlformats.org/drawingml/2006/main" xmlns="" val="1572432146"/>
       </p:ext>
     </p:extLst>
   </p:cSld>
@@ -5850,7 +5648,7 @@
   <p:timing>
     <p:tnLst>
       <p:par>
-        <p:cTn xmlns:p14="http://schemas.microsoft.com/office/powerpoint/2010/main" id="1" dur="indefinite" restart="never" nodeType="tmRoot"/>
+        <p:cTn id="1" dur="indefinite" restart="never" nodeType="tmRoot"/>
       </p:par>
     </p:tnLst>
   </p:timing>
@@ -5858,7 +5656,7 @@
 </file>
 
 <file path=ppt/slides/slide4.xml><?xml version="1.0" encoding="utf-8"?>
-<p:sld xmlns:a="http://schemas.openxmlformats.org/drawingml/2006/main" xmlns:r="http://schemas.openxmlformats.org/officeDocument/2006/relationships" xmlns:p="http://schemas.openxmlformats.org/presentationml/2006/main">
+<p:sld xmlns:a="http://schemas.openxmlformats.org/drawingml/2006/main" xmlns:r="http://schemas.openxmlformats.org/officeDocument/2006/relationships" xmlns:mc="http://schemas.openxmlformats.org/markup-compatibility/2006" xmlns:mv="urn:schemas-microsoft-com:mac:vml" xmlns:p="http://schemas.openxmlformats.org/presentationml/2006/main" mc:Ignorable="mv" mc:PreserveAttributes="mv:*">
   <p:cSld>
     <p:spTree>
       <p:nvGrpSpPr>
@@ -5876,12 +5674,65 @@
       </p:grpSpPr>
       <p:sp>
         <p:nvSpPr>
-          <p:cNvPr id="3" name="Title 2"/>
-          <p:cNvSpPr>
+          <p:cNvPr id="303106" name="Slide Number Placeholder 3"/>
+          <p:cNvSpPr txBox="1">
             <a:spLocks noGrp="1"/>
           </p:cNvSpPr>
-          <p:nvPr>
-            <p:ph type="title"/>
+          <p:nvPr/>
+        </p:nvSpPr>
+        <p:spPr bwMode="auto">
+          <a:xfrm>
+            <a:off x="315868" y="9189943"/>
+            <a:ext cx="866378" cy="541514"/>
+          </a:xfrm>
+          <a:prstGeom prst="rect">
+            <a:avLst/>
+          </a:prstGeom>
+          <a:noFill/>
+          <a:ln>
+            <a:miter lim="800000"/>
+            <a:headEnd/>
+            <a:tailEnd/>
+          </a:ln>
+        </p:spPr>
+        <p:txBody>
+          <a:bodyPr lIns="154707" tIns="77354" rIns="154707" bIns="77354"/>
+          <a:lstStyle/>
+          <a:p>
+            <a:pPr eaLnBrk="0" hangingPunct="0">
+              <a:defRPr/>
+            </a:pPr>
+            <a:fld id="{1BD3BB7B-F997-4B7C-BCBE-A063D59C732E}" type="slidenum">
+              <a:rPr lang="en-US" sz="1500" b="1">
+                <a:solidFill>
+                  <a:srgbClr val="7B7B7B"/>
+                </a:solidFill>
+                <a:ea typeface="ＭＳ Ｐゴシック" pitchFamily="34" charset="-128"/>
+                <a:cs typeface="+mn-cs"/>
+              </a:rPr>
+              <a:pPr eaLnBrk="0" hangingPunct="0">
+                <a:defRPr/>
+              </a:pPr>
+              <a:t>4</a:t>
+            </a:fld>
+            <a:endParaRPr lang="en-US" sz="1500" b="1" dirty="0">
+              <a:solidFill>
+                <a:srgbClr val="7B7B7B"/>
+              </a:solidFill>
+              <a:ea typeface="ＭＳ Ｐゴシック" pitchFamily="34" charset="-128"/>
+              <a:cs typeface="+mn-cs"/>
+            </a:endParaRPr>
+          </a:p>
+        </p:txBody>
+      </p:sp>
+      <p:sp>
+        <p:nvSpPr>
+          <p:cNvPr id="5" name="Text Placeholder 4"/>
+          <p:cNvSpPr>
+            <a:spLocks noGrp="1"/>
+          </p:cNvSpPr>
+          <p:nvPr>
+            <p:ph type="body" sz="quarter" idx="10"/>
           </p:nvPr>
         </p:nvSpPr>
         <p:spPr/>
@@ -5891,53 +5742,31 @@
           <a:p>
             <a:r>
               <a:rPr lang="en-US" dirty="0" smtClean="0"/>
-              <a:t>Title</a:t>
-            </a:r>
-            <a:endParaRPr lang="en-US" dirty="0"/>
-          </a:p>
-        </p:txBody>
-      </p:sp>
-      <p:sp>
-        <p:nvSpPr>
-          <p:cNvPr id="4" name="Content Placeholder 3"/>
-          <p:cNvSpPr>
-            <a:spLocks noGrp="1"/>
-          </p:cNvSpPr>
-          <p:nvPr>
-            <p:ph idx="1"/>
-          </p:nvPr>
-        </p:nvSpPr>
-        <p:spPr/>
-        <p:txBody>
-          <a:bodyPr>
-            <a:normAutofit/>
-          </a:bodyPr>
-          <a:lstStyle/>
-          <a:p>
-            <a:r>
-              <a:rPr lang="en-US" sz="3200" dirty="0" smtClean="0"/>
-              <a:t>Content</a:t>
-            </a:r>
-          </a:p>
-          <a:p>
-            <a:endParaRPr lang="en-US" sz="3200" dirty="0"/>
+              <a:t>Demo</a:t>
+            </a:r>
+            <a:r>
+              <a:rPr lang="en-US" dirty="0" smtClean="0"/>
+              <a:t> 4: Checking for Errors</a:t>
+            </a:r>
+            <a:endParaRPr lang="en-US" dirty="0" smtClean="0"/>
           </a:p>
         </p:txBody>
       </p:sp>
     </p:spTree>
     <p:extLst>
       <p:ext uri="{BB962C8B-B14F-4D97-AF65-F5344CB8AC3E}">
-        <p14:creationId xmlns:p14="http://schemas.microsoft.com/office/powerpoint/2010/main" val="1723545958"/>
+        <p14:creationId xmlns="" xmlns:a="http://schemas.openxmlformats.org/drawingml/2006/main" xmlns:r="http://schemas.openxmlformats.org/officeDocument/2006/relationships" xmlns:p="http://schemas.openxmlformats.org/presentationml/2006/main" xmlns:p14="http://schemas.microsoft.com/office/powerpoint/2010/main" xmlns:mv="urn:schemas-microsoft-com:mac:vml" xmlns:mc="http://schemas.openxmlformats.org/markup-compatibility/2006" val="3539376714"/>
       </p:ext>
     </p:extLst>
   </p:cSld>
   <p:clrMapOvr>
     <a:masterClrMapping/>
   </p:clrMapOvr>
+  <p:transition/>
   <p:timing>
     <p:tnLst>
       <p:par>
-        <p:cTn xmlns:p14="http://schemas.microsoft.com/office/powerpoint/2010/main" id="1" dur="indefinite" restart="never" nodeType="tmRoot"/>
+        <p:cTn id="1" dur="indefinite" restart="never" nodeType="tmRoot"/>
       </p:par>
     </p:tnLst>
   </p:timing>
@@ -5945,7 +5774,7 @@
 </file>
 
 <file path=ppt/slides/slide5.xml><?xml version="1.0" encoding="utf-8"?>
-<p:sld xmlns:a="http://schemas.openxmlformats.org/drawingml/2006/main" xmlns:r="http://schemas.openxmlformats.org/officeDocument/2006/relationships" xmlns:p="http://schemas.openxmlformats.org/presentationml/2006/main">
+<p:sld xmlns:a="http://schemas.openxmlformats.org/drawingml/2006/main" xmlns:r="http://schemas.openxmlformats.org/officeDocument/2006/relationships" xmlns:mc="http://schemas.openxmlformats.org/markup-compatibility/2006" xmlns:mv="urn:schemas-microsoft-com:mac:vml" xmlns:p="http://schemas.openxmlformats.org/presentationml/2006/main" mc:Ignorable="mv" mc:PreserveAttributes="mv:*">
   <p:cSld>
     <p:spTree>
       <p:nvGrpSpPr>
@@ -5963,267 +5792,6 @@
       </p:grpSpPr>
       <p:sp>
         <p:nvSpPr>
-          <p:cNvPr id="3" name="Title 2"/>
-          <p:cNvSpPr>
-            <a:spLocks noGrp="1"/>
-          </p:cNvSpPr>
-          <p:nvPr>
-            <p:ph type="title"/>
-          </p:nvPr>
-        </p:nvSpPr>
-        <p:spPr/>
-        <p:txBody>
-          <a:bodyPr/>
-          <a:lstStyle/>
-          <a:p>
-            <a:r>
-              <a:rPr lang="en-US" dirty="0" smtClean="0"/>
-              <a:t>Title</a:t>
-            </a:r>
-            <a:endParaRPr lang="en-US" dirty="0"/>
-          </a:p>
-        </p:txBody>
-      </p:sp>
-      <p:sp>
-        <p:nvSpPr>
-          <p:cNvPr id="4" name="Content Placeholder 3"/>
-          <p:cNvSpPr>
-            <a:spLocks noGrp="1"/>
-          </p:cNvSpPr>
-          <p:nvPr>
-            <p:ph idx="1"/>
-          </p:nvPr>
-        </p:nvSpPr>
-        <p:spPr/>
-        <p:txBody>
-          <a:bodyPr>
-            <a:normAutofit/>
-          </a:bodyPr>
-          <a:lstStyle/>
-          <a:p>
-            <a:r>
-              <a:rPr lang="en-US" sz="3200" dirty="0" smtClean="0"/>
-              <a:t>Content</a:t>
-            </a:r>
-          </a:p>
-          <a:p>
-            <a:endParaRPr lang="en-US" sz="3200" dirty="0"/>
-          </a:p>
-        </p:txBody>
-      </p:sp>
-    </p:spTree>
-    <p:extLst>
-      <p:ext uri="{BB962C8B-B14F-4D97-AF65-F5344CB8AC3E}">
-        <p14:creationId xmlns:p14="http://schemas.microsoft.com/office/powerpoint/2010/main" val="2108713422"/>
-      </p:ext>
-    </p:extLst>
-  </p:cSld>
-  <p:clrMapOvr>
-    <a:masterClrMapping/>
-  </p:clrMapOvr>
-  <p:timing>
-    <p:tnLst>
-      <p:par>
-        <p:cTn xmlns:p14="http://schemas.microsoft.com/office/powerpoint/2010/main" id="1" dur="indefinite" restart="never" nodeType="tmRoot"/>
-      </p:par>
-    </p:tnLst>
-  </p:timing>
-</p:sld>
-</file>
-
-<file path=ppt/slides/slide6.xml><?xml version="1.0" encoding="utf-8"?>
-<p:sld xmlns:a="http://schemas.openxmlformats.org/drawingml/2006/main" xmlns:r="http://schemas.openxmlformats.org/officeDocument/2006/relationships" xmlns:p="http://schemas.openxmlformats.org/presentationml/2006/main">
-  <p:cSld>
-    <p:spTree>
-      <p:nvGrpSpPr>
-        <p:cNvPr id="1" name=""/>
-        <p:cNvGrpSpPr/>
-        <p:nvPr/>
-      </p:nvGrpSpPr>
-      <p:grpSpPr>
-        <a:xfrm>
-          <a:off x="0" y="0"/>
-          <a:ext cx="0" cy="0"/>
-          <a:chOff x="0" y="0"/>
-          <a:chExt cx="0" cy="0"/>
-        </a:xfrm>
-      </p:grpSpPr>
-      <p:sp>
-        <p:nvSpPr>
-          <p:cNvPr id="3" name="Title 2"/>
-          <p:cNvSpPr>
-            <a:spLocks noGrp="1"/>
-          </p:cNvSpPr>
-          <p:nvPr>
-            <p:ph type="title"/>
-          </p:nvPr>
-        </p:nvSpPr>
-        <p:spPr/>
-        <p:txBody>
-          <a:bodyPr/>
-          <a:lstStyle/>
-          <a:p>
-            <a:r>
-              <a:rPr lang="en-US" dirty="0" smtClean="0"/>
-              <a:t>Title</a:t>
-            </a:r>
-            <a:endParaRPr lang="en-US" dirty="0"/>
-          </a:p>
-        </p:txBody>
-      </p:sp>
-      <p:sp>
-        <p:nvSpPr>
-          <p:cNvPr id="4" name="Content Placeholder 3"/>
-          <p:cNvSpPr>
-            <a:spLocks noGrp="1"/>
-          </p:cNvSpPr>
-          <p:nvPr>
-            <p:ph idx="1"/>
-          </p:nvPr>
-        </p:nvSpPr>
-        <p:spPr/>
-        <p:txBody>
-          <a:bodyPr>
-            <a:normAutofit/>
-          </a:bodyPr>
-          <a:lstStyle/>
-          <a:p>
-            <a:r>
-              <a:rPr lang="en-US" sz="3200" dirty="0" smtClean="0"/>
-              <a:t>Content</a:t>
-            </a:r>
-          </a:p>
-          <a:p>
-            <a:endParaRPr lang="en-US" sz="3200" dirty="0"/>
-          </a:p>
-        </p:txBody>
-      </p:sp>
-    </p:spTree>
-    <p:extLst>
-      <p:ext uri="{BB962C8B-B14F-4D97-AF65-F5344CB8AC3E}">
-        <p14:creationId xmlns:p14="http://schemas.microsoft.com/office/powerpoint/2010/main" val="2805855639"/>
-      </p:ext>
-    </p:extLst>
-  </p:cSld>
-  <p:clrMapOvr>
-    <a:masterClrMapping/>
-  </p:clrMapOvr>
-  <p:timing>
-    <p:tnLst>
-      <p:par>
-        <p:cTn xmlns:p14="http://schemas.microsoft.com/office/powerpoint/2010/main" id="1" dur="indefinite" restart="never" nodeType="tmRoot"/>
-      </p:par>
-    </p:tnLst>
-  </p:timing>
-</p:sld>
-</file>
-
-<file path=ppt/slides/slide7.xml><?xml version="1.0" encoding="utf-8"?>
-<p:sld xmlns:a="http://schemas.openxmlformats.org/drawingml/2006/main" xmlns:r="http://schemas.openxmlformats.org/officeDocument/2006/relationships" xmlns:p="http://schemas.openxmlformats.org/presentationml/2006/main">
-  <p:cSld>
-    <p:spTree>
-      <p:nvGrpSpPr>
-        <p:cNvPr id="1" name=""/>
-        <p:cNvGrpSpPr/>
-        <p:nvPr/>
-      </p:nvGrpSpPr>
-      <p:grpSpPr>
-        <a:xfrm>
-          <a:off x="0" y="0"/>
-          <a:ext cx="0" cy="0"/>
-          <a:chOff x="0" y="0"/>
-          <a:chExt cx="0" cy="0"/>
-        </a:xfrm>
-      </p:grpSpPr>
-      <p:sp>
-        <p:nvSpPr>
-          <p:cNvPr id="3" name="Title 2"/>
-          <p:cNvSpPr>
-            <a:spLocks noGrp="1"/>
-          </p:cNvSpPr>
-          <p:nvPr>
-            <p:ph type="title"/>
-          </p:nvPr>
-        </p:nvSpPr>
-        <p:spPr/>
-        <p:txBody>
-          <a:bodyPr/>
-          <a:lstStyle/>
-          <a:p>
-            <a:r>
-              <a:rPr lang="en-US" dirty="0" smtClean="0"/>
-              <a:t>Title</a:t>
-            </a:r>
-            <a:endParaRPr lang="en-US" dirty="0"/>
-          </a:p>
-        </p:txBody>
-      </p:sp>
-      <p:sp>
-        <p:nvSpPr>
-          <p:cNvPr id="4" name="Content Placeholder 3"/>
-          <p:cNvSpPr>
-            <a:spLocks noGrp="1"/>
-          </p:cNvSpPr>
-          <p:nvPr>
-            <p:ph idx="1"/>
-          </p:nvPr>
-        </p:nvSpPr>
-        <p:spPr/>
-        <p:txBody>
-          <a:bodyPr>
-            <a:normAutofit/>
-          </a:bodyPr>
-          <a:lstStyle/>
-          <a:p>
-            <a:r>
-              <a:rPr lang="en-US" sz="3200" dirty="0" smtClean="0"/>
-              <a:t>Content</a:t>
-            </a:r>
-          </a:p>
-          <a:p>
-            <a:endParaRPr lang="en-US" sz="3200" dirty="0"/>
-          </a:p>
-        </p:txBody>
-      </p:sp>
-    </p:spTree>
-    <p:extLst>
-      <p:ext uri="{BB962C8B-B14F-4D97-AF65-F5344CB8AC3E}">
-        <p14:creationId xmlns:p14="http://schemas.microsoft.com/office/powerpoint/2010/main" val="2514608167"/>
-      </p:ext>
-    </p:extLst>
-  </p:cSld>
-  <p:clrMapOvr>
-    <a:masterClrMapping/>
-  </p:clrMapOvr>
-  <p:timing>
-    <p:tnLst>
-      <p:par>
-        <p:cTn xmlns:p14="http://schemas.microsoft.com/office/powerpoint/2010/main" id="1" dur="indefinite" restart="never" nodeType="tmRoot"/>
-      </p:par>
-    </p:tnLst>
-  </p:timing>
-</p:sld>
-</file>
-
-<file path=ppt/slides/slide8.xml><?xml version="1.0" encoding="utf-8"?>
-<p:sld xmlns:a="http://schemas.openxmlformats.org/drawingml/2006/main" xmlns:r="http://schemas.openxmlformats.org/officeDocument/2006/relationships" xmlns:p="http://schemas.openxmlformats.org/presentationml/2006/main">
-  <p:cSld>
-    <p:spTree>
-      <p:nvGrpSpPr>
-        <p:cNvPr id="1" name=""/>
-        <p:cNvGrpSpPr/>
-        <p:nvPr/>
-      </p:nvGrpSpPr>
-      <p:grpSpPr>
-        <a:xfrm>
-          <a:off x="0" y="0"/>
-          <a:ext cx="0" cy="0"/>
-          <a:chOff x="0" y="0"/>
-          <a:chExt cx="0" cy="0"/>
-        </a:xfrm>
-      </p:grpSpPr>
-      <p:sp>
-        <p:nvSpPr>
           <p:cNvPr id="3" name="Text Placeholder 2"/>
           <p:cNvSpPr>
             <a:spLocks noGrp="1"/>
@@ -6298,7 +5866,7 @@
               <a:pPr>
                 <a:defRPr/>
               </a:pPr>
-              <a:t>8</a:t>
+              <a:t>5</a:t>
             </a:fld>
             <a:endParaRPr lang="en-US" dirty="0"/>
           </a:p>
@@ -6307,20 +5875,20 @@
     </p:spTree>
     <p:extLst>
       <p:ext uri="{BB962C8B-B14F-4D97-AF65-F5344CB8AC3E}">
-        <p14:creationId xmlns:p14="http://schemas.microsoft.com/office/powerpoint/2010/main" val="3700295984"/>
+        <p14:creationId xmlns:p14="http://schemas.microsoft.com/office/powerpoint/2010/main" xmlns:p="http://schemas.openxmlformats.org/presentationml/2006/main" xmlns:r="http://schemas.openxmlformats.org/officeDocument/2006/relationships" xmlns:a="http://schemas.openxmlformats.org/drawingml/2006/main" xmlns="" val="3700295984"/>
       </p:ext>
     </p:extLst>
   </p:cSld>
   <p:clrMapOvr>
     <a:masterClrMapping/>
   </p:clrMapOvr>
-  <p:transition xmlns:p14="http://schemas.microsoft.com/office/powerpoint/2010/main" spd="med">
+  <p:transition spd="med">
     <p:fade/>
   </p:transition>
   <p:timing>
     <p:tnLst>
       <p:par>
-        <p:cTn xmlns:p14="http://schemas.microsoft.com/office/powerpoint/2010/main" id="1" dur="indefinite" restart="never" nodeType="tmRoot"/>
+        <p:cTn id="1" dur="indefinite" restart="never" nodeType="tmRoot"/>
       </p:par>
     </p:tnLst>
   </p:timing>

</xml_diff>